<commit_message>
Updated the logo in marketing material.
</commit_message>
<xml_diff>
--- a/Pitch_Deck.pptx
+++ b/Pitch_Deck.pptx
@@ -6270,7 +6270,7 @@
           </a:bodyPr>
           <a:p>
             <a:pPr algn="r"/>
-            <a:fld id="{CC8956EA-F475-4FEB-A9DA-CA00EDD231E6}" type="slidenum">
+            <a:fld id="{6A368730-E88C-4A57-86C3-2EE908025312}" type="slidenum">
               <a:rPr b="0" lang="en-US" sz="1400" spc="-1" strike="noStrike">
                 <a:solidFill>
                   <a:srgbClr val="dddddd"/>
@@ -6919,7 +6919,7 @@
           </a:bodyPr>
           <a:p>
             <a:pPr algn="r"/>
-            <a:fld id="{62DF50BA-33E1-4C33-A6A6-FA63C490A172}" type="slidenum">
+            <a:fld id="{C2BB6A75-3D24-41BC-9EAC-11921FDC6546}" type="slidenum">
               <a:rPr b="0" lang="en-US" sz="1400" spc="-1" strike="noStrike">
                 <a:solidFill>
                   <a:srgbClr val="dddddd"/>
@@ -7873,7 +7873,7 @@
           </a:bodyPr>
           <a:p>
             <a:pPr algn="r"/>
-            <a:fld id="{F8E3019D-11B2-4833-B687-50FF4B1DDA7C}" type="slidenum">
+            <a:fld id="{CF099B9A-3D70-474D-AA69-6C8F18497D5C}" type="slidenum">
               <a:rPr b="0" lang="en-US" sz="1400" spc="-1" strike="noStrike">
                 <a:solidFill>
                   <a:srgbClr val="dddddd"/>
@@ -8206,7 +8206,7 @@
           </a:bodyPr>
           <a:p>
             <a:pPr algn="r"/>
-            <a:fld id="{B009A083-8AA2-4B8E-B8EA-4E73A7517DFC}" type="slidenum">
+            <a:fld id="{DAE8DF14-725C-43BA-869F-877EB6DCE009}" type="slidenum">
               <a:rPr b="0" lang="en-US" sz="1400" spc="-1" strike="noStrike">
                 <a:solidFill>
                   <a:srgbClr val="dddddd"/>
@@ -8582,6 +8582,29 @@
           </a:ln>
         </p:spPr>
       </p:pic>
+      <p:pic>
+        <p:nvPicPr>
+          <p:cNvPr id="188" name="" descr=""/>
+          <p:cNvPicPr/>
+          <p:nvPr/>
+        </p:nvPicPr>
+        <p:blipFill>
+          <a:blip r:embed="rId2"/>
+          <a:stretch/>
+        </p:blipFill>
+        <p:spPr>
+          <a:xfrm>
+            <a:off x="363960" y="15120"/>
+            <a:ext cx="9396720" cy="5669640"/>
+          </a:xfrm>
+          <a:prstGeom prst="rect">
+            <a:avLst/>
+          </a:prstGeom>
+          <a:ln w="18000">
+            <a:noFill/>
+          </a:ln>
+        </p:spPr>
+      </p:pic>
     </p:spTree>
   </p:cSld>
   <mc:AlternateContent>
@@ -8614,7 +8637,7 @@
       </p:grpSpPr>
       <p:sp>
         <p:nvSpPr>
-          <p:cNvPr id="188" name=""/>
+          <p:cNvPr id="189" name=""/>
           <p:cNvSpPr txBox="1"/>
           <p:nvPr/>
         </p:nvSpPr>
@@ -8648,7 +8671,7 @@
       </p:sp>
       <p:pic>
         <p:nvPicPr>
-          <p:cNvPr id="189" name="" descr=""/>
+          <p:cNvPr id="190" name="" descr=""/>
           <p:cNvPicPr/>
           <p:nvPr/>
         </p:nvPicPr>
@@ -8701,7 +8724,7 @@
       </p:grpSpPr>
       <p:sp>
         <p:nvSpPr>
-          <p:cNvPr id="190" name=""/>
+          <p:cNvPr id="191" name=""/>
           <p:cNvSpPr txBox="1"/>
           <p:nvPr/>
         </p:nvSpPr>
@@ -8735,7 +8758,7 @@
       </p:sp>
       <p:pic>
         <p:nvPicPr>
-          <p:cNvPr id="191" name="" descr=""/>
+          <p:cNvPr id="192" name="" descr=""/>
           <p:cNvPicPr/>
           <p:nvPr/>
         </p:nvPicPr>
@@ -8788,7 +8811,7 @@
       </p:grpSpPr>
       <p:sp>
         <p:nvSpPr>
-          <p:cNvPr id="192" name=""/>
+          <p:cNvPr id="193" name=""/>
           <p:cNvSpPr txBox="1"/>
           <p:nvPr/>
         </p:nvSpPr>
@@ -8822,7 +8845,7 @@
       </p:sp>
       <p:pic>
         <p:nvPicPr>
-          <p:cNvPr id="193" name="" descr=""/>
+          <p:cNvPr id="194" name="" descr=""/>
           <p:cNvPicPr/>
           <p:nvPr/>
         </p:nvPicPr>
@@ -8875,7 +8898,7 @@
       </p:grpSpPr>
       <p:sp>
         <p:nvSpPr>
-          <p:cNvPr id="194" name=""/>
+          <p:cNvPr id="195" name=""/>
           <p:cNvSpPr txBox="1"/>
           <p:nvPr/>
         </p:nvSpPr>
@@ -8909,7 +8932,7 @@
       </p:sp>
       <p:pic>
         <p:nvPicPr>
-          <p:cNvPr id="195" name="" descr=""/>
+          <p:cNvPr id="196" name="" descr=""/>
           <p:cNvPicPr/>
           <p:nvPr/>
         </p:nvPicPr>
@@ -8962,7 +8985,7 @@
       </p:grpSpPr>
       <p:sp>
         <p:nvSpPr>
-          <p:cNvPr id="196" name=""/>
+          <p:cNvPr id="197" name=""/>
           <p:cNvSpPr txBox="1"/>
           <p:nvPr/>
         </p:nvSpPr>
@@ -8996,7 +9019,7 @@
       </p:sp>
       <p:pic>
         <p:nvPicPr>
-          <p:cNvPr id="197" name="" descr=""/>
+          <p:cNvPr id="198" name="" descr=""/>
           <p:cNvPicPr/>
           <p:nvPr/>
         </p:nvPicPr>
@@ -9049,7 +9072,7 @@
       </p:grpSpPr>
       <p:sp>
         <p:nvSpPr>
-          <p:cNvPr id="198" name=""/>
+          <p:cNvPr id="199" name=""/>
           <p:cNvSpPr txBox="1"/>
           <p:nvPr/>
         </p:nvSpPr>
@@ -9083,7 +9106,7 @@
       </p:sp>
       <p:pic>
         <p:nvPicPr>
-          <p:cNvPr id="199" name="" descr=""/>
+          <p:cNvPr id="200" name="" descr=""/>
           <p:cNvPicPr/>
           <p:nvPr/>
         </p:nvPicPr>
@@ -9136,7 +9159,7 @@
       </p:grpSpPr>
       <p:sp>
         <p:nvSpPr>
-          <p:cNvPr id="200" name=""/>
+          <p:cNvPr id="201" name=""/>
           <p:cNvSpPr txBox="1"/>
           <p:nvPr/>
         </p:nvSpPr>
@@ -9170,7 +9193,7 @@
       </p:sp>
       <p:pic>
         <p:nvPicPr>
-          <p:cNvPr id="201" name="" descr=""/>
+          <p:cNvPr id="202" name="" descr=""/>
           <p:cNvPicPr/>
           <p:nvPr/>
         </p:nvPicPr>
@@ -9223,7 +9246,7 @@
       </p:grpSpPr>
       <p:sp>
         <p:nvSpPr>
-          <p:cNvPr id="202" name=""/>
+          <p:cNvPr id="203" name=""/>
           <p:cNvSpPr txBox="1"/>
           <p:nvPr/>
         </p:nvSpPr>
@@ -9257,7 +9280,7 @@
       </p:sp>
       <p:pic>
         <p:nvPicPr>
-          <p:cNvPr id="203" name="" descr=""/>
+          <p:cNvPr id="204" name="" descr=""/>
           <p:cNvPicPr/>
           <p:nvPr/>
         </p:nvPicPr>

</xml_diff>